<commit_message>
Variant 1 of kafka SSL
</commit_message>
<xml_diff>
--- a/docs/how-to-slides/Gtg-Create-kafka-script.pptx
+++ b/docs/how-to-slides/Gtg-Create-kafka-script.pptx
@@ -6,9 +6,8 @@
   </p:sldMasterIdLst>
   <p:sldIdLst>
     <p:sldId id="256" r:id="rId2"/>
-    <p:sldId id="259" r:id="rId3"/>
-    <p:sldId id="258" r:id="rId4"/>
-    <p:sldId id="260" r:id="rId5"/>
+    <p:sldId id="258" r:id="rId3"/>
+    <p:sldId id="260" r:id="rId4"/>
   </p:sldIdLst>
   <p:sldSz cx="9144000" cy="6858000" type="screen4x3"/>
   <p:notesSz cx="6858000" cy="9144000"/>
@@ -254,7 +253,7 @@
             <a:fld id="{C1027E9F-FA41-416A-9F2C-F465002B321A}" type="datetimeFigureOut">
               <a:rPr lang="ru-RU" smtClean="0"/>
               <a:pPr/>
-              <a:t>18.08.2023</a:t>
+              <a:t>05.09.2023</a:t>
             </a:fld>
             <a:endParaRPr lang="ru-RU"/>
           </a:p>
@@ -615,7 +614,7 @@
             <a:fld id="{C1027E9F-FA41-416A-9F2C-F465002B321A}" type="datetimeFigureOut">
               <a:rPr lang="ru-RU" smtClean="0"/>
               <a:pPr/>
-              <a:t>18.08.2023</a:t>
+              <a:t>05.09.2023</a:t>
             </a:fld>
             <a:endParaRPr lang="ru-RU"/>
           </a:p>
@@ -792,7 +791,7 @@
             <a:fld id="{C1027E9F-FA41-416A-9F2C-F465002B321A}" type="datetimeFigureOut">
               <a:rPr lang="ru-RU" smtClean="0"/>
               <a:pPr/>
-              <a:t>18.08.2023</a:t>
+              <a:t>05.09.2023</a:t>
             </a:fld>
             <a:endParaRPr lang="ru-RU"/>
           </a:p>
@@ -1029,7 +1028,7 @@
             <a:fld id="{C1027E9F-FA41-416A-9F2C-F465002B321A}" type="datetimeFigureOut">
               <a:rPr lang="ru-RU" smtClean="0"/>
               <a:pPr/>
-              <a:t>18.08.2023</a:t>
+              <a:t>05.09.2023</a:t>
             </a:fld>
             <a:endParaRPr lang="ru-RU"/>
           </a:p>
@@ -1300,7 +1299,7 @@
             <a:fld id="{C1027E9F-FA41-416A-9F2C-F465002B321A}" type="datetimeFigureOut">
               <a:rPr lang="ru-RU" smtClean="0"/>
               <a:pPr/>
-              <a:t>18.08.2023</a:t>
+              <a:t>05.09.2023</a:t>
             </a:fld>
             <a:endParaRPr lang="ru-RU"/>
           </a:p>
@@ -1522,7 +1521,7 @@
             <a:fld id="{C1027E9F-FA41-416A-9F2C-F465002B321A}" type="datetimeFigureOut">
               <a:rPr lang="ru-RU" smtClean="0"/>
               <a:pPr/>
-              <a:t>18.08.2023</a:t>
+              <a:t>05.09.2023</a:t>
             </a:fld>
             <a:endParaRPr lang="ru-RU"/>
           </a:p>
@@ -1876,7 +1875,7 @@
             <a:fld id="{C1027E9F-FA41-416A-9F2C-F465002B321A}" type="datetimeFigureOut">
               <a:rPr lang="ru-RU" smtClean="0"/>
               <a:pPr/>
-              <a:t>18.08.2023</a:t>
+              <a:t>05.09.2023</a:t>
             </a:fld>
             <a:endParaRPr lang="ru-RU"/>
           </a:p>
@@ -2110,7 +2109,7 @@
             <a:fld id="{C1027E9F-FA41-416A-9F2C-F465002B321A}" type="datetimeFigureOut">
               <a:rPr lang="ru-RU" smtClean="0"/>
               <a:pPr/>
-              <a:t>18.08.2023</a:t>
+              <a:t>05.09.2023</a:t>
             </a:fld>
             <a:endParaRPr lang="ru-RU"/>
           </a:p>
@@ -2252,7 +2251,7 @@
             <a:fld id="{C1027E9F-FA41-416A-9F2C-F465002B321A}" type="datetimeFigureOut">
               <a:rPr lang="ru-RU" smtClean="0"/>
               <a:pPr/>
-              <a:t>18.08.2023</a:t>
+              <a:t>05.09.2023</a:t>
             </a:fld>
             <a:endParaRPr lang="ru-RU"/>
           </a:p>
@@ -2531,7 +2530,7 @@
             <a:fld id="{C1027E9F-FA41-416A-9F2C-F465002B321A}" type="datetimeFigureOut">
               <a:rPr lang="ru-RU" smtClean="0"/>
               <a:pPr/>
-              <a:t>18.08.2023</a:t>
+              <a:t>05.09.2023</a:t>
             </a:fld>
             <a:endParaRPr lang="ru-RU"/>
           </a:p>
@@ -2940,7 +2939,7 @@
             <a:fld id="{C1027E9F-FA41-416A-9F2C-F465002B321A}" type="datetimeFigureOut">
               <a:rPr lang="ru-RU" smtClean="0"/>
               <a:pPr/>
-              <a:t>18.08.2023</a:t>
+              <a:t>05.09.2023</a:t>
             </a:fld>
             <a:endParaRPr lang="ru-RU"/>
           </a:p>
@@ -3280,7 +3279,7 @@
             <a:fld id="{C1027E9F-FA41-416A-9F2C-F465002B321A}" type="datetimeFigureOut">
               <a:rPr lang="ru-RU" smtClean="0"/>
               <a:pPr/>
-              <a:t>18.08.2023</a:t>
+              <a:t>05.09.2023</a:t>
             </a:fld>
             <a:endParaRPr lang="ru-RU"/>
           </a:p>
@@ -3825,7 +3824,7 @@
         <p:spPr/>
         <p:txBody>
           <a:bodyPr>
-            <a:normAutofit/>
+            <a:normAutofit fontScale="90000"/>
           </a:bodyPr>
           <a:lstStyle/>
           <a:p>
@@ -3843,11 +3842,11 @@
             </a:r>
             <a:r>
               <a:rPr lang="en-US" dirty="0" smtClean="0"/>
-              <a:t>MQ</a:t>
+              <a:t>Kafka </a:t>
             </a:r>
             <a:r>
               <a:rPr lang="ru-RU" dirty="0" smtClean="0"/>
-              <a:t> для </a:t>
+              <a:t>для </a:t>
             </a:r>
             <a:r>
               <a:rPr lang="en-US" dirty="0" smtClean="0"/>
@@ -3926,8 +3925,12 @@
           <a:lstStyle/>
           <a:p>
             <a:r>
-              <a:rPr lang="en-US" sz="2400" dirty="0" smtClean="0"/>
-              <a:t>Gatling “JMS</a:t>
+              <a:rPr lang="ru-RU" sz="2400" dirty="0" smtClean="0"/>
+              <a:t>Из чего состоит </a:t>
+            </a:r>
+            <a:r>
+              <a:rPr lang="ru-RU" sz="2400" dirty="0" err="1" smtClean="0"/>
+              <a:t>скрипт</a:t>
             </a:r>
             <a:r>
               <a:rPr lang="ru-RU" sz="2400" dirty="0" smtClean="0"/>
@@ -3935,14 +3938,15 @@
             </a:r>
             <a:r>
               <a:rPr lang="en-US" sz="2400" dirty="0" smtClean="0"/>
-              <a:t>Protocol”</a:t>
-            </a:r>
-            <a:br>
+              <a:t>Kafka </a:t>
+            </a:r>
+            <a:r>
+              <a:rPr lang="ru-RU" sz="2400" dirty="0" smtClean="0"/>
+              <a:t>для </a:t>
+            </a:r>
+            <a:r>
               <a:rPr lang="en-US" sz="2400" dirty="0" smtClean="0"/>
-            </a:br>
-            <a:r>
-              <a:rPr lang="en-US" sz="1400" dirty="0" smtClean="0"/>
-              <a:t>https://gatling.io/docs/gatling/reference/current/jms/</a:t>
+              <a:t>Gatling</a:t>
             </a:r>
             <a:r>
               <a:rPr lang="ru-RU" sz="2400" dirty="0" smtClean="0"/>
@@ -3952,134 +3956,6 @@
               <a:rPr lang="ru-RU" sz="2400" dirty="0" smtClean="0"/>
             </a:br>
             <a:endParaRPr lang="ru-RU" sz="2400" dirty="0"/>
-          </a:p>
-        </p:txBody>
-      </p:sp>
-      <p:sp>
-        <p:nvSpPr>
-          <p:cNvPr id="3" name="Содержимое 2"/>
-          <p:cNvSpPr>
-            <a:spLocks noGrp="1"/>
-          </p:cNvSpPr>
-          <p:nvPr>
-            <p:ph sz="quarter" idx="1"/>
-          </p:nvPr>
-        </p:nvSpPr>
-        <p:spPr>
-          <a:xfrm>
-            <a:off x="357158" y="1285860"/>
-            <a:ext cx="8229600" cy="3638560"/>
-          </a:xfrm>
-        </p:spPr>
-        <p:txBody>
-          <a:bodyPr>
-            <a:normAutofit fontScale="92500" lnSpcReduction="10000"/>
-          </a:bodyPr>
-          <a:lstStyle/>
-          <a:p>
-            <a:r>
-              <a:rPr lang="ru-RU" sz="2400" dirty="0" smtClean="0"/>
-              <a:t>Существует несколько </a:t>
-            </a:r>
-            <a:r>
-              <a:rPr lang="ru-RU" sz="2400" dirty="0" err="1" smtClean="0"/>
-              <a:t>плагинов</a:t>
-            </a:r>
-            <a:r>
-              <a:rPr lang="ru-RU" sz="2400" dirty="0" smtClean="0"/>
-              <a:t> для работы с брокерами очередей</a:t>
-            </a:r>
-            <a:r>
-              <a:rPr lang="en-US" sz="2400" dirty="0" smtClean="0"/>
-              <a:t>: JMS, MQTT, </a:t>
-            </a:r>
-            <a:r>
-              <a:rPr lang="ru-RU" sz="2400" dirty="0" smtClean="0"/>
-              <a:t> </a:t>
-            </a:r>
-            <a:r>
-              <a:rPr lang="en-US" sz="2400" dirty="0" smtClean="0"/>
-              <a:t>AMQP</a:t>
-            </a:r>
-          </a:p>
-          <a:p>
-            <a:r>
-              <a:rPr lang="ru-RU" sz="2400" dirty="0" smtClean="0"/>
-              <a:t>Дальше мы будем рассматривать </a:t>
-            </a:r>
-            <a:r>
-              <a:rPr lang="en-US" sz="2400" dirty="0" smtClean="0"/>
-              <a:t>JMS</a:t>
-            </a:r>
-            <a:r>
-              <a:rPr lang="ru-RU" sz="2400" dirty="0" smtClean="0"/>
-              <a:t> </a:t>
-            </a:r>
-            <a:r>
-              <a:rPr lang="ru-RU" sz="2400" dirty="0" err="1" smtClean="0"/>
-              <a:t>плагин</a:t>
-            </a:r>
-            <a:r>
-              <a:rPr lang="ru-RU" sz="2400" dirty="0" smtClean="0"/>
-              <a:t>, так как он максимально подходит для тестирования систем с брокером </a:t>
-            </a:r>
-            <a:r>
-              <a:rPr lang="en-US" sz="2400" dirty="0" smtClean="0"/>
-              <a:t>IBM MQ</a:t>
-            </a:r>
-            <a:r>
-              <a:rPr lang="ru-RU" sz="2400" dirty="0" smtClean="0"/>
-              <a:t>.</a:t>
-            </a:r>
-            <a:endParaRPr lang="en-US" sz="2400" dirty="0" smtClean="0"/>
-          </a:p>
-          <a:p>
-            <a:pPr>
-              <a:buNone/>
-            </a:pPr>
-            <a:endParaRPr lang="en-US" sz="2400" dirty="0" smtClean="0"/>
-          </a:p>
-          <a:p>
-            <a:pPr>
-              <a:buNone/>
-            </a:pPr>
-            <a:r>
-              <a:rPr lang="ru-RU" sz="2400" dirty="0" smtClean="0"/>
-              <a:t>Про сравнение протоколов можете почитать:</a:t>
-            </a:r>
-          </a:p>
-          <a:p>
-            <a:pPr>
-              <a:buFontTx/>
-              <a:buChar char="-"/>
-            </a:pPr>
-            <a:r>
-              <a:rPr lang="en-US" sz="2400" dirty="0" smtClean="0">
-                <a:hlinkClick r:id="rId2"/>
-              </a:rPr>
-              <a:t>https://dzone.com/articles/comparison-of-asynchronous-messaging-technologies</a:t>
-            </a:r>
-            <a:endParaRPr lang="ru-RU" sz="2400" dirty="0" smtClean="0"/>
-          </a:p>
-          <a:p>
-            <a:pPr>
-              <a:buFontTx/>
-              <a:buChar char="-"/>
-            </a:pPr>
-            <a:r>
-              <a:rPr lang="en-US" sz="2400" dirty="0" smtClean="0">
-                <a:hlinkClick r:id="rId3"/>
-              </a:rPr>
-              <a:t>https://www.educba.com/amqp-vs-jms/</a:t>
-            </a:r>
-            <a:endParaRPr lang="ru-RU" sz="2400" dirty="0" smtClean="0"/>
-          </a:p>
-          <a:p>
-            <a:pPr>
-              <a:buFontTx/>
-              <a:buChar char="-"/>
-            </a:pPr>
-            <a:endParaRPr lang="en-US" sz="2400" dirty="0" smtClean="0"/>
           </a:p>
         </p:txBody>
       </p:sp>
@@ -4140,6 +4016,805 @@
           <a:lstStyle/>
           <a:p>
             <a:endParaRPr lang="ru-RU"/>
+          </a:p>
+        </p:txBody>
+      </p:sp>
+      <p:sp>
+        <p:nvSpPr>
+          <p:cNvPr id="8" name="Прямоугольник 7"/>
+          <p:cNvSpPr/>
+          <p:nvPr/>
+        </p:nvSpPr>
+        <p:spPr>
+          <a:xfrm>
+            <a:off x="3143240" y="4572008"/>
+            <a:ext cx="2071702" cy="714380"/>
+          </a:xfrm>
+          <a:prstGeom prst="rect">
+            <a:avLst/>
+          </a:prstGeom>
+          <a:solidFill>
+            <a:schemeClr val="bg1"/>
+          </a:solidFill>
+        </p:spPr>
+        <p:style>
+          <a:lnRef idx="2">
+            <a:schemeClr val="accent1">
+              <a:shade val="50000"/>
+            </a:schemeClr>
+          </a:lnRef>
+          <a:fillRef idx="1">
+            <a:schemeClr val="accent1"/>
+          </a:fillRef>
+          <a:effectRef idx="0">
+            <a:schemeClr val="accent1"/>
+          </a:effectRef>
+          <a:fontRef idx="minor">
+            <a:schemeClr val="lt1"/>
+          </a:fontRef>
+        </p:style>
+        <p:txBody>
+          <a:bodyPr rtlCol="0" anchor="ctr"/>
+          <a:lstStyle/>
+          <a:p>
+            <a:pPr algn="ctr"/>
+            <a:r>
+              <a:rPr lang="en-US" sz="1400" dirty="0" err="1" smtClean="0">
+                <a:solidFill>
+                  <a:schemeClr val="tx1"/>
+                </a:solidFill>
+              </a:rPr>
+              <a:t>ProtocolBuilder</a:t>
+            </a:r>
+            <a:endParaRPr lang="en-US" sz="1400" dirty="0">
+              <a:solidFill>
+                <a:schemeClr val="tx1"/>
+              </a:solidFill>
+            </a:endParaRPr>
+          </a:p>
+        </p:txBody>
+      </p:sp>
+      <p:sp>
+        <p:nvSpPr>
+          <p:cNvPr id="9" name="Прямоугольник 8"/>
+          <p:cNvSpPr/>
+          <p:nvPr/>
+        </p:nvSpPr>
+        <p:spPr>
+          <a:xfrm>
+            <a:off x="1500166" y="1357298"/>
+            <a:ext cx="2071702" cy="714380"/>
+          </a:xfrm>
+          <a:prstGeom prst="rect">
+            <a:avLst/>
+          </a:prstGeom>
+          <a:solidFill>
+            <a:schemeClr val="bg1"/>
+          </a:solidFill>
+        </p:spPr>
+        <p:style>
+          <a:lnRef idx="2">
+            <a:schemeClr val="accent1">
+              <a:shade val="50000"/>
+            </a:schemeClr>
+          </a:lnRef>
+          <a:fillRef idx="1">
+            <a:schemeClr val="accent1"/>
+          </a:fillRef>
+          <a:effectRef idx="0">
+            <a:schemeClr val="accent1"/>
+          </a:effectRef>
+          <a:fontRef idx="minor">
+            <a:schemeClr val="lt1"/>
+          </a:fontRef>
+        </p:style>
+        <p:txBody>
+          <a:bodyPr rtlCol="0" anchor="ctr"/>
+          <a:lstStyle/>
+          <a:p>
+            <a:pPr algn="ctr"/>
+            <a:r>
+              <a:rPr lang="en-US" sz="1400" dirty="0" err="1" smtClean="0">
+                <a:solidFill>
+                  <a:schemeClr val="tx1"/>
+                </a:solidFill>
+              </a:rPr>
+              <a:t>ActionBuilder</a:t>
+            </a:r>
+            <a:endParaRPr lang="en-US" sz="1400" dirty="0">
+              <a:solidFill>
+                <a:schemeClr val="tx1"/>
+              </a:solidFill>
+            </a:endParaRPr>
+          </a:p>
+        </p:txBody>
+      </p:sp>
+      <p:sp>
+        <p:nvSpPr>
+          <p:cNvPr id="10" name="Прямоугольник 9"/>
+          <p:cNvSpPr/>
+          <p:nvPr/>
+        </p:nvSpPr>
+        <p:spPr>
+          <a:xfrm>
+            <a:off x="3143240" y="3571876"/>
+            <a:ext cx="2071702" cy="714380"/>
+          </a:xfrm>
+          <a:prstGeom prst="rect">
+            <a:avLst/>
+          </a:prstGeom>
+          <a:solidFill>
+            <a:schemeClr val="bg1"/>
+          </a:solidFill>
+        </p:spPr>
+        <p:style>
+          <a:lnRef idx="2">
+            <a:schemeClr val="accent1">
+              <a:shade val="50000"/>
+            </a:schemeClr>
+          </a:lnRef>
+          <a:fillRef idx="1">
+            <a:schemeClr val="accent1"/>
+          </a:fillRef>
+          <a:effectRef idx="0">
+            <a:schemeClr val="accent1"/>
+          </a:effectRef>
+          <a:fontRef idx="minor">
+            <a:schemeClr val="lt1"/>
+          </a:fontRef>
+        </p:style>
+        <p:txBody>
+          <a:bodyPr rtlCol="0" anchor="ctr"/>
+          <a:lstStyle/>
+          <a:p>
+            <a:pPr algn="ctr"/>
+            <a:r>
+              <a:rPr lang="en-US" sz="1400" dirty="0" smtClean="0">
+                <a:solidFill>
+                  <a:schemeClr val="tx1"/>
+                </a:solidFill>
+              </a:rPr>
+              <a:t>Simulation</a:t>
+            </a:r>
+          </a:p>
+        </p:txBody>
+      </p:sp>
+      <p:cxnSp>
+        <p:nvCxnSpPr>
+          <p:cNvPr id="21" name="Прямая со стрелкой 20"/>
+          <p:cNvCxnSpPr/>
+          <p:nvPr/>
+        </p:nvCxnSpPr>
+        <p:spPr>
+          <a:xfrm rot="5400000" flipH="1" flipV="1">
+            <a:off x="4000496" y="4429132"/>
+            <a:ext cx="285752" cy="1588"/>
+          </a:xfrm>
+          <a:prstGeom prst="straightConnector1">
+            <a:avLst/>
+          </a:prstGeom>
+          <a:ln>
+            <a:tailEnd type="arrow"/>
+          </a:ln>
+        </p:spPr>
+        <p:style>
+          <a:lnRef idx="1">
+            <a:schemeClr val="accent1"/>
+          </a:lnRef>
+          <a:fillRef idx="0">
+            <a:schemeClr val="accent1"/>
+          </a:fillRef>
+          <a:effectRef idx="0">
+            <a:schemeClr val="accent1"/>
+          </a:effectRef>
+          <a:fontRef idx="minor">
+            <a:schemeClr val="tx1"/>
+          </a:fontRef>
+        </p:style>
+      </p:cxnSp>
+      <p:sp>
+        <p:nvSpPr>
+          <p:cNvPr id="31" name="Прямоугольник 30"/>
+          <p:cNvSpPr/>
+          <p:nvPr/>
+        </p:nvSpPr>
+        <p:spPr>
+          <a:xfrm>
+            <a:off x="1500166" y="2500306"/>
+            <a:ext cx="2071702" cy="714380"/>
+          </a:xfrm>
+          <a:prstGeom prst="rect">
+            <a:avLst/>
+          </a:prstGeom>
+          <a:solidFill>
+            <a:schemeClr val="bg1"/>
+          </a:solidFill>
+        </p:spPr>
+        <p:style>
+          <a:lnRef idx="2">
+            <a:schemeClr val="accent1">
+              <a:shade val="50000"/>
+            </a:schemeClr>
+          </a:lnRef>
+          <a:fillRef idx="1">
+            <a:schemeClr val="accent1"/>
+          </a:fillRef>
+          <a:effectRef idx="0">
+            <a:schemeClr val="accent1"/>
+          </a:effectRef>
+          <a:fontRef idx="minor">
+            <a:schemeClr val="lt1"/>
+          </a:fontRef>
+        </p:style>
+        <p:txBody>
+          <a:bodyPr rtlCol="0" anchor="ctr"/>
+          <a:lstStyle/>
+          <a:p>
+            <a:pPr algn="ctr"/>
+            <a:r>
+              <a:rPr lang="en-US" sz="1400" dirty="0" err="1" smtClean="0">
+                <a:solidFill>
+                  <a:schemeClr val="tx1"/>
+                </a:solidFill>
+              </a:rPr>
+              <a:t>ScenarioBuilder</a:t>
+            </a:r>
+            <a:endParaRPr lang="en-US" sz="1400" dirty="0">
+              <a:solidFill>
+                <a:schemeClr val="tx1"/>
+              </a:solidFill>
+            </a:endParaRPr>
+          </a:p>
+        </p:txBody>
+      </p:sp>
+      <p:sp>
+        <p:nvSpPr>
+          <p:cNvPr id="32" name="Прямоугольник 31"/>
+          <p:cNvSpPr/>
+          <p:nvPr/>
+        </p:nvSpPr>
+        <p:spPr>
+          <a:xfrm>
+            <a:off x="1643042" y="1571612"/>
+            <a:ext cx="2071702" cy="714380"/>
+          </a:xfrm>
+          <a:prstGeom prst="rect">
+            <a:avLst/>
+          </a:prstGeom>
+          <a:solidFill>
+            <a:schemeClr val="bg1"/>
+          </a:solidFill>
+        </p:spPr>
+        <p:style>
+          <a:lnRef idx="2">
+            <a:schemeClr val="accent1">
+              <a:shade val="50000"/>
+            </a:schemeClr>
+          </a:lnRef>
+          <a:fillRef idx="1">
+            <a:schemeClr val="accent1"/>
+          </a:fillRef>
+          <a:effectRef idx="0">
+            <a:schemeClr val="accent1"/>
+          </a:effectRef>
+          <a:fontRef idx="minor">
+            <a:schemeClr val="lt1"/>
+          </a:fontRef>
+        </p:style>
+        <p:txBody>
+          <a:bodyPr rtlCol="0" anchor="ctr"/>
+          <a:lstStyle/>
+          <a:p>
+            <a:pPr algn="ctr"/>
+            <a:r>
+              <a:rPr lang="en-US" sz="1400" dirty="0" err="1" smtClean="0">
+                <a:solidFill>
+                  <a:schemeClr val="tx1"/>
+                </a:solidFill>
+              </a:rPr>
+              <a:t>ActionBuilder</a:t>
+            </a:r>
+            <a:endParaRPr lang="en-US" sz="1400" dirty="0">
+              <a:solidFill>
+                <a:schemeClr val="tx1"/>
+              </a:solidFill>
+            </a:endParaRPr>
+          </a:p>
+        </p:txBody>
+      </p:sp>
+      <p:cxnSp>
+        <p:nvCxnSpPr>
+          <p:cNvPr id="34" name="Прямая со стрелкой 33"/>
+          <p:cNvCxnSpPr/>
+          <p:nvPr/>
+        </p:nvCxnSpPr>
+        <p:spPr>
+          <a:xfrm rot="5400000">
+            <a:off x="2321703" y="2393149"/>
+            <a:ext cx="214314" cy="1588"/>
+          </a:xfrm>
+          <a:prstGeom prst="straightConnector1">
+            <a:avLst/>
+          </a:prstGeom>
+          <a:ln>
+            <a:tailEnd type="arrow"/>
+          </a:ln>
+        </p:spPr>
+        <p:style>
+          <a:lnRef idx="1">
+            <a:schemeClr val="accent1"/>
+          </a:lnRef>
+          <a:fillRef idx="0">
+            <a:schemeClr val="accent1"/>
+          </a:fillRef>
+          <a:effectRef idx="0">
+            <a:schemeClr val="accent1"/>
+          </a:effectRef>
+          <a:fontRef idx="minor">
+            <a:schemeClr val="tx1"/>
+          </a:fontRef>
+        </p:style>
+      </p:cxnSp>
+      <p:cxnSp>
+        <p:nvCxnSpPr>
+          <p:cNvPr id="36" name="Прямая со стрелкой 35"/>
+          <p:cNvCxnSpPr>
+            <a:stCxn id="31" idx="2"/>
+          </p:cNvCxnSpPr>
+          <p:nvPr/>
+        </p:nvCxnSpPr>
+        <p:spPr>
+          <a:xfrm rot="16200000" flipH="1">
+            <a:off x="2661033" y="3089669"/>
+            <a:ext cx="357192" cy="607225"/>
+          </a:xfrm>
+          <a:prstGeom prst="straightConnector1">
+            <a:avLst/>
+          </a:prstGeom>
+          <a:ln>
+            <a:tailEnd type="arrow"/>
+          </a:ln>
+        </p:spPr>
+        <p:style>
+          <a:lnRef idx="1">
+            <a:schemeClr val="accent1"/>
+          </a:lnRef>
+          <a:fillRef idx="0">
+            <a:schemeClr val="accent1"/>
+          </a:fillRef>
+          <a:effectRef idx="0">
+            <a:schemeClr val="accent1"/>
+          </a:effectRef>
+          <a:fontRef idx="minor">
+            <a:schemeClr val="tx1"/>
+          </a:fontRef>
+        </p:style>
+      </p:cxnSp>
+      <p:sp>
+        <p:nvSpPr>
+          <p:cNvPr id="39" name="Прямоугольник 38"/>
+          <p:cNvSpPr/>
+          <p:nvPr/>
+        </p:nvSpPr>
+        <p:spPr>
+          <a:xfrm>
+            <a:off x="4929190" y="1428736"/>
+            <a:ext cx="2071702" cy="714380"/>
+          </a:xfrm>
+          <a:prstGeom prst="rect">
+            <a:avLst/>
+          </a:prstGeom>
+          <a:solidFill>
+            <a:schemeClr val="bg1"/>
+          </a:solidFill>
+        </p:spPr>
+        <p:style>
+          <a:lnRef idx="2">
+            <a:schemeClr val="accent1">
+              <a:shade val="50000"/>
+            </a:schemeClr>
+          </a:lnRef>
+          <a:fillRef idx="1">
+            <a:schemeClr val="accent1"/>
+          </a:fillRef>
+          <a:effectRef idx="0">
+            <a:schemeClr val="accent1"/>
+          </a:effectRef>
+          <a:fontRef idx="minor">
+            <a:schemeClr val="lt1"/>
+          </a:fontRef>
+        </p:style>
+        <p:txBody>
+          <a:bodyPr rtlCol="0" anchor="ctr"/>
+          <a:lstStyle/>
+          <a:p>
+            <a:pPr algn="ctr"/>
+            <a:r>
+              <a:rPr lang="en-US" sz="1400" dirty="0" err="1" smtClean="0">
+                <a:solidFill>
+                  <a:schemeClr val="tx1"/>
+                </a:solidFill>
+              </a:rPr>
+              <a:t>ActionBuilder</a:t>
+            </a:r>
+            <a:endParaRPr lang="en-US" sz="1400" dirty="0">
+              <a:solidFill>
+                <a:schemeClr val="tx1"/>
+              </a:solidFill>
+            </a:endParaRPr>
+          </a:p>
+        </p:txBody>
+      </p:sp>
+      <p:sp>
+        <p:nvSpPr>
+          <p:cNvPr id="40" name="Прямоугольник 39"/>
+          <p:cNvSpPr/>
+          <p:nvPr/>
+        </p:nvSpPr>
+        <p:spPr>
+          <a:xfrm>
+            <a:off x="4929190" y="2571744"/>
+            <a:ext cx="2071702" cy="714380"/>
+          </a:xfrm>
+          <a:prstGeom prst="rect">
+            <a:avLst/>
+          </a:prstGeom>
+          <a:solidFill>
+            <a:schemeClr val="bg1"/>
+          </a:solidFill>
+        </p:spPr>
+        <p:style>
+          <a:lnRef idx="2">
+            <a:schemeClr val="accent1">
+              <a:shade val="50000"/>
+            </a:schemeClr>
+          </a:lnRef>
+          <a:fillRef idx="1">
+            <a:schemeClr val="accent1"/>
+          </a:fillRef>
+          <a:effectRef idx="0">
+            <a:schemeClr val="accent1"/>
+          </a:effectRef>
+          <a:fontRef idx="minor">
+            <a:schemeClr val="lt1"/>
+          </a:fontRef>
+        </p:style>
+        <p:txBody>
+          <a:bodyPr rtlCol="0" anchor="ctr"/>
+          <a:lstStyle/>
+          <a:p>
+            <a:pPr algn="ctr"/>
+            <a:r>
+              <a:rPr lang="en-US" sz="1400" dirty="0" err="1" smtClean="0">
+                <a:solidFill>
+                  <a:schemeClr val="tx1"/>
+                </a:solidFill>
+              </a:rPr>
+              <a:t>ScenarioBuilder</a:t>
+            </a:r>
+            <a:endParaRPr lang="en-US" sz="1400" dirty="0">
+              <a:solidFill>
+                <a:schemeClr val="tx1"/>
+              </a:solidFill>
+            </a:endParaRPr>
+          </a:p>
+        </p:txBody>
+      </p:sp>
+      <p:sp>
+        <p:nvSpPr>
+          <p:cNvPr id="41" name="Прямоугольник 40"/>
+          <p:cNvSpPr/>
+          <p:nvPr/>
+        </p:nvSpPr>
+        <p:spPr>
+          <a:xfrm>
+            <a:off x="5072066" y="1643050"/>
+            <a:ext cx="2071702" cy="714380"/>
+          </a:xfrm>
+          <a:prstGeom prst="rect">
+            <a:avLst/>
+          </a:prstGeom>
+          <a:solidFill>
+            <a:schemeClr val="bg1"/>
+          </a:solidFill>
+        </p:spPr>
+        <p:style>
+          <a:lnRef idx="2">
+            <a:schemeClr val="accent1">
+              <a:shade val="50000"/>
+            </a:schemeClr>
+          </a:lnRef>
+          <a:fillRef idx="1">
+            <a:schemeClr val="accent1"/>
+          </a:fillRef>
+          <a:effectRef idx="0">
+            <a:schemeClr val="accent1"/>
+          </a:effectRef>
+          <a:fontRef idx="minor">
+            <a:schemeClr val="lt1"/>
+          </a:fontRef>
+        </p:style>
+        <p:txBody>
+          <a:bodyPr rtlCol="0" anchor="ctr"/>
+          <a:lstStyle/>
+          <a:p>
+            <a:pPr algn="ctr"/>
+            <a:r>
+              <a:rPr lang="en-US" sz="1400" dirty="0" err="1" smtClean="0">
+                <a:solidFill>
+                  <a:schemeClr val="tx1"/>
+                </a:solidFill>
+              </a:rPr>
+              <a:t>ActionBuilder</a:t>
+            </a:r>
+            <a:endParaRPr lang="en-US" sz="1400" dirty="0">
+              <a:solidFill>
+                <a:schemeClr val="tx1"/>
+              </a:solidFill>
+            </a:endParaRPr>
+          </a:p>
+        </p:txBody>
+      </p:sp>
+      <p:cxnSp>
+        <p:nvCxnSpPr>
+          <p:cNvPr id="42" name="Прямая со стрелкой 41"/>
+          <p:cNvCxnSpPr/>
+          <p:nvPr/>
+        </p:nvCxnSpPr>
+        <p:spPr>
+          <a:xfrm rot="5400000">
+            <a:off x="5750727" y="2464587"/>
+            <a:ext cx="214314" cy="1588"/>
+          </a:xfrm>
+          <a:prstGeom prst="straightConnector1">
+            <a:avLst/>
+          </a:prstGeom>
+          <a:ln>
+            <a:tailEnd type="arrow"/>
+          </a:ln>
+        </p:spPr>
+        <p:style>
+          <a:lnRef idx="1">
+            <a:schemeClr val="accent1"/>
+          </a:lnRef>
+          <a:fillRef idx="0">
+            <a:schemeClr val="accent1"/>
+          </a:fillRef>
+          <a:effectRef idx="0">
+            <a:schemeClr val="accent1"/>
+          </a:effectRef>
+          <a:fontRef idx="minor">
+            <a:schemeClr val="tx1"/>
+          </a:fontRef>
+        </p:style>
+      </p:cxnSp>
+      <p:cxnSp>
+        <p:nvCxnSpPr>
+          <p:cNvPr id="43" name="Прямая со стрелкой 42"/>
+          <p:cNvCxnSpPr>
+            <a:stCxn id="40" idx="2"/>
+          </p:cNvCxnSpPr>
+          <p:nvPr/>
+        </p:nvCxnSpPr>
+        <p:spPr>
+          <a:xfrm rot="5400000">
+            <a:off x="5447115" y="3053952"/>
+            <a:ext cx="285754" cy="750099"/>
+          </a:xfrm>
+          <a:prstGeom prst="straightConnector1">
+            <a:avLst/>
+          </a:prstGeom>
+          <a:ln>
+            <a:tailEnd type="arrow"/>
+          </a:ln>
+        </p:spPr>
+        <p:style>
+          <a:lnRef idx="1">
+            <a:schemeClr val="accent1"/>
+          </a:lnRef>
+          <a:fillRef idx="0">
+            <a:schemeClr val="accent1"/>
+          </a:fillRef>
+          <a:effectRef idx="0">
+            <a:schemeClr val="accent1"/>
+          </a:effectRef>
+          <a:fontRef idx="minor">
+            <a:schemeClr val="tx1"/>
+          </a:fontRef>
+        </p:style>
+      </p:cxnSp>
+      <p:sp>
+        <p:nvSpPr>
+          <p:cNvPr id="48" name="TextBox 47"/>
+          <p:cNvSpPr txBox="1"/>
+          <p:nvPr/>
+        </p:nvSpPr>
+        <p:spPr>
+          <a:xfrm>
+            <a:off x="285720" y="2500306"/>
+            <a:ext cx="1173655" cy="307777"/>
+          </a:xfrm>
+          <a:prstGeom prst="rect">
+            <a:avLst/>
+          </a:prstGeom>
+          <a:noFill/>
+        </p:spPr>
+        <p:txBody>
+          <a:bodyPr wrap="none" rtlCol="0">
+            <a:spAutoFit/>
+          </a:bodyPr>
+          <a:lstStyle/>
+          <a:p>
+            <a:r>
+              <a:rPr lang="ru-RU" sz="1400" dirty="0" smtClean="0"/>
+              <a:t>Сценарий </a:t>
+            </a:r>
+            <a:r>
+              <a:rPr lang="en-US" sz="1400" dirty="0" smtClean="0"/>
+              <a:t>#1</a:t>
+            </a:r>
+            <a:endParaRPr lang="ru-RU" sz="1400" dirty="0"/>
+          </a:p>
+        </p:txBody>
+      </p:sp>
+      <p:sp>
+        <p:nvSpPr>
+          <p:cNvPr id="49" name="TextBox 48"/>
+          <p:cNvSpPr txBox="1"/>
+          <p:nvPr/>
+        </p:nvSpPr>
+        <p:spPr>
+          <a:xfrm>
+            <a:off x="7072330" y="2571744"/>
+            <a:ext cx="1425005" cy="307777"/>
+          </a:xfrm>
+          <a:prstGeom prst="rect">
+            <a:avLst/>
+          </a:prstGeom>
+          <a:noFill/>
+        </p:spPr>
+        <p:txBody>
+          <a:bodyPr wrap="none" rtlCol="0">
+            <a:spAutoFit/>
+          </a:bodyPr>
+          <a:lstStyle/>
+          <a:p>
+            <a:r>
+              <a:rPr lang="ru-RU" sz="1400" dirty="0" smtClean="0"/>
+              <a:t>Сценарий </a:t>
+            </a:r>
+            <a:r>
+              <a:rPr lang="en-US" sz="1400" dirty="0" smtClean="0"/>
+              <a:t>#2, …</a:t>
+            </a:r>
+            <a:endParaRPr lang="ru-RU" sz="1400" dirty="0"/>
+          </a:p>
+        </p:txBody>
+      </p:sp>
+      <p:sp>
+        <p:nvSpPr>
+          <p:cNvPr id="50" name="TextBox 49"/>
+          <p:cNvSpPr txBox="1"/>
+          <p:nvPr/>
+        </p:nvSpPr>
+        <p:spPr>
+          <a:xfrm>
+            <a:off x="357158" y="1428736"/>
+            <a:ext cx="899798" cy="307777"/>
+          </a:xfrm>
+          <a:prstGeom prst="rect">
+            <a:avLst/>
+          </a:prstGeom>
+          <a:noFill/>
+        </p:spPr>
+        <p:txBody>
+          <a:bodyPr wrap="none" rtlCol="0">
+            <a:spAutoFit/>
+          </a:bodyPr>
+          <a:lstStyle/>
+          <a:p>
+            <a:r>
+              <a:rPr lang="ru-RU" sz="1400" dirty="0" smtClean="0"/>
+              <a:t>Действия</a:t>
+            </a:r>
+            <a:endParaRPr lang="ru-RU" sz="1400" dirty="0"/>
+          </a:p>
+        </p:txBody>
+      </p:sp>
+      <p:sp>
+        <p:nvSpPr>
+          <p:cNvPr id="51" name="TextBox 50"/>
+          <p:cNvSpPr txBox="1"/>
+          <p:nvPr/>
+        </p:nvSpPr>
+        <p:spPr>
+          <a:xfrm>
+            <a:off x="7500958" y="1500174"/>
+            <a:ext cx="899798" cy="307777"/>
+          </a:xfrm>
+          <a:prstGeom prst="rect">
+            <a:avLst/>
+          </a:prstGeom>
+          <a:noFill/>
+        </p:spPr>
+        <p:txBody>
+          <a:bodyPr wrap="none" rtlCol="0">
+            <a:spAutoFit/>
+          </a:bodyPr>
+          <a:lstStyle/>
+          <a:p>
+            <a:r>
+              <a:rPr lang="ru-RU" sz="1400" dirty="0" smtClean="0"/>
+              <a:t>Действия</a:t>
+            </a:r>
+            <a:endParaRPr lang="ru-RU" sz="1400" dirty="0"/>
+          </a:p>
+        </p:txBody>
+      </p:sp>
+      <p:sp>
+        <p:nvSpPr>
+          <p:cNvPr id="52" name="TextBox 51"/>
+          <p:cNvSpPr txBox="1"/>
+          <p:nvPr/>
+        </p:nvSpPr>
+        <p:spPr>
+          <a:xfrm>
+            <a:off x="1357290" y="3714752"/>
+            <a:ext cx="1768433" cy="523220"/>
+          </a:xfrm>
+          <a:prstGeom prst="rect">
+            <a:avLst/>
+          </a:prstGeom>
+          <a:noFill/>
+        </p:spPr>
+        <p:txBody>
+          <a:bodyPr wrap="none" rtlCol="0">
+            <a:spAutoFit/>
+          </a:bodyPr>
+          <a:lstStyle/>
+          <a:p>
+            <a:r>
+              <a:rPr lang="ru-RU" sz="1400" dirty="0" smtClean="0"/>
+              <a:t>Симуляция, </a:t>
+            </a:r>
+            <a:br>
+              <a:rPr lang="ru-RU" sz="1400" dirty="0" smtClean="0"/>
+            </a:br>
+            <a:r>
+              <a:rPr lang="ru-RU" sz="1400" dirty="0" smtClean="0"/>
+              <a:t>собственно, сам тест</a:t>
+            </a:r>
+            <a:endParaRPr lang="ru-RU" sz="1400" dirty="0"/>
+          </a:p>
+        </p:txBody>
+      </p:sp>
+      <p:sp>
+        <p:nvSpPr>
+          <p:cNvPr id="60" name="TextBox 59"/>
+          <p:cNvSpPr txBox="1"/>
+          <p:nvPr/>
+        </p:nvSpPr>
+        <p:spPr>
+          <a:xfrm>
+            <a:off x="1357290" y="4714884"/>
+            <a:ext cx="1772024" cy="307777"/>
+          </a:xfrm>
+          <a:prstGeom prst="rect">
+            <a:avLst/>
+          </a:prstGeom>
+          <a:noFill/>
+        </p:spPr>
+        <p:txBody>
+          <a:bodyPr wrap="none" rtlCol="0">
+            <a:spAutoFit/>
+          </a:bodyPr>
+          <a:lstStyle/>
+          <a:p>
+            <a:r>
+              <a:rPr lang="ru-RU" sz="1400" dirty="0" smtClean="0"/>
+              <a:t>Описание протокола</a:t>
+            </a:r>
+            <a:endParaRPr lang="ru-RU" sz="1400" dirty="0"/>
           </a:p>
         </p:txBody>
       </p:sp>
@@ -4159,1067 +4834,6 @@
 </file>
 
 <file path=ppt/slides/slide3.xml><?xml version="1.0" encoding="utf-8"?>
-<p:sld xmlns:a="http://schemas.openxmlformats.org/drawingml/2006/main" xmlns:r="http://schemas.openxmlformats.org/officeDocument/2006/relationships" xmlns:p="http://schemas.openxmlformats.org/presentationml/2006/main">
-  <p:cSld>
-    <p:spTree>
-      <p:nvGrpSpPr>
-        <p:cNvPr id="1" name=""/>
-        <p:cNvGrpSpPr/>
-        <p:nvPr/>
-      </p:nvGrpSpPr>
-      <p:grpSpPr>
-        <a:xfrm>
-          <a:off x="0" y="0"/>
-          <a:ext cx="0" cy="0"/>
-          <a:chOff x="0" y="0"/>
-          <a:chExt cx="0" cy="0"/>
-        </a:xfrm>
-      </p:grpSpPr>
-      <p:sp>
-        <p:nvSpPr>
-          <p:cNvPr id="2" name="Заголовок 1"/>
-          <p:cNvSpPr>
-            <a:spLocks noGrp="1"/>
-          </p:cNvSpPr>
-          <p:nvPr>
-            <p:ph type="title"/>
-          </p:nvPr>
-        </p:nvSpPr>
-        <p:spPr/>
-        <p:txBody>
-          <a:bodyPr>
-            <a:noAutofit/>
-          </a:bodyPr>
-          <a:lstStyle/>
-          <a:p>
-            <a:r>
-              <a:rPr lang="ru-RU" sz="2400" dirty="0" smtClean="0"/>
-              <a:t>Из чего состоит </a:t>
-            </a:r>
-            <a:r>
-              <a:rPr lang="ru-RU" sz="2400" dirty="0" err="1" smtClean="0"/>
-              <a:t>скрипт</a:t>
-            </a:r>
-            <a:r>
-              <a:rPr lang="ru-RU" sz="2400" dirty="0" smtClean="0"/>
-              <a:t> </a:t>
-            </a:r>
-            <a:r>
-              <a:rPr lang="en-US" sz="2400" dirty="0" smtClean="0"/>
-              <a:t>MQ</a:t>
-            </a:r>
-            <a:r>
-              <a:rPr lang="ru-RU" sz="2400" dirty="0" smtClean="0"/>
-              <a:t> для </a:t>
-            </a:r>
-            <a:r>
-              <a:rPr lang="en-US" sz="2400" dirty="0" smtClean="0"/>
-              <a:t>Gatling</a:t>
-            </a:r>
-            <a:r>
-              <a:rPr lang="ru-RU" sz="2400" dirty="0" smtClean="0"/>
-              <a:t/>
-            </a:r>
-            <a:br>
-              <a:rPr lang="ru-RU" sz="2400" dirty="0" smtClean="0"/>
-            </a:br>
-            <a:endParaRPr lang="ru-RU" sz="2400" dirty="0"/>
-          </a:p>
-        </p:txBody>
-      </p:sp>
-      <p:sp>
-        <p:nvSpPr>
-          <p:cNvPr id="1026" name="AutoShape 2" descr="запуск ракеты png | PNGWing"/>
-          <p:cNvSpPr>
-            <a:spLocks noChangeAspect="1" noChangeArrowheads="1"/>
-          </p:cNvSpPr>
-          <p:nvPr/>
-        </p:nvSpPr>
-        <p:spPr bwMode="auto">
-          <a:xfrm>
-            <a:off x="155575" y="-144463"/>
-            <a:ext cx="304800" cy="304801"/>
-          </a:xfrm>
-          <a:prstGeom prst="rect">
-            <a:avLst/>
-          </a:prstGeom>
-          <a:noFill/>
-        </p:spPr>
-        <p:txBody>
-          <a:bodyPr vert="horz" wrap="square" lIns="91440" tIns="45720" rIns="91440" bIns="45720" numCol="1" anchor="t" anchorCtr="0" compatLnSpc="1">
-            <a:prstTxWarp prst="textNoShape">
-              <a:avLst/>
-            </a:prstTxWarp>
-          </a:bodyPr>
-          <a:lstStyle/>
-          <a:p>
-            <a:endParaRPr lang="ru-RU"/>
-          </a:p>
-        </p:txBody>
-      </p:sp>
-      <p:sp>
-        <p:nvSpPr>
-          <p:cNvPr id="1028" name="AutoShape 4" descr="запуск ракеты png | PNGWing"/>
-          <p:cNvSpPr>
-            <a:spLocks noChangeAspect="1" noChangeArrowheads="1"/>
-          </p:cNvSpPr>
-          <p:nvPr/>
-        </p:nvSpPr>
-        <p:spPr bwMode="auto">
-          <a:xfrm>
-            <a:off x="155575" y="-144463"/>
-            <a:ext cx="304800" cy="304801"/>
-          </a:xfrm>
-          <a:prstGeom prst="rect">
-            <a:avLst/>
-          </a:prstGeom>
-          <a:noFill/>
-        </p:spPr>
-        <p:txBody>
-          <a:bodyPr vert="horz" wrap="square" lIns="91440" tIns="45720" rIns="91440" bIns="45720" numCol="1" anchor="t" anchorCtr="0" compatLnSpc="1">
-            <a:prstTxWarp prst="textNoShape">
-              <a:avLst/>
-            </a:prstTxWarp>
-          </a:bodyPr>
-          <a:lstStyle/>
-          <a:p>
-            <a:endParaRPr lang="ru-RU"/>
-          </a:p>
-        </p:txBody>
-      </p:sp>
-      <p:sp>
-        <p:nvSpPr>
-          <p:cNvPr id="7" name="Прямоугольник 6"/>
-          <p:cNvSpPr/>
-          <p:nvPr/>
-        </p:nvSpPr>
-        <p:spPr>
-          <a:xfrm>
-            <a:off x="3143240" y="5572140"/>
-            <a:ext cx="2071702" cy="714380"/>
-          </a:xfrm>
-          <a:prstGeom prst="rect">
-            <a:avLst/>
-          </a:prstGeom>
-          <a:solidFill>
-            <a:schemeClr val="bg1"/>
-          </a:solidFill>
-        </p:spPr>
-        <p:style>
-          <a:lnRef idx="2">
-            <a:schemeClr val="accent1">
-              <a:shade val="50000"/>
-            </a:schemeClr>
-          </a:lnRef>
-          <a:fillRef idx="1">
-            <a:schemeClr val="accent1"/>
-          </a:fillRef>
-          <a:effectRef idx="0">
-            <a:schemeClr val="accent1"/>
-          </a:effectRef>
-          <a:fontRef idx="minor">
-            <a:schemeClr val="lt1"/>
-          </a:fontRef>
-        </p:style>
-        <p:txBody>
-          <a:bodyPr rtlCol="0" anchor="ctr"/>
-          <a:lstStyle/>
-          <a:p>
-            <a:pPr algn="ctr"/>
-            <a:r>
-              <a:rPr lang="en-US" sz="1400" dirty="0" err="1" smtClean="0">
-                <a:solidFill>
-                  <a:schemeClr val="tx1"/>
-                </a:solidFill>
-              </a:rPr>
-              <a:t>MQConnectionFactory</a:t>
-            </a:r>
-            <a:endParaRPr lang="ru-RU" sz="1400" dirty="0">
-              <a:solidFill>
-                <a:schemeClr val="tx1"/>
-              </a:solidFill>
-            </a:endParaRPr>
-          </a:p>
-        </p:txBody>
-      </p:sp>
-      <p:sp>
-        <p:nvSpPr>
-          <p:cNvPr id="8" name="Прямоугольник 7"/>
-          <p:cNvSpPr/>
-          <p:nvPr/>
-        </p:nvSpPr>
-        <p:spPr>
-          <a:xfrm>
-            <a:off x="3143240" y="4572008"/>
-            <a:ext cx="2071702" cy="714380"/>
-          </a:xfrm>
-          <a:prstGeom prst="rect">
-            <a:avLst/>
-          </a:prstGeom>
-          <a:solidFill>
-            <a:schemeClr val="bg1"/>
-          </a:solidFill>
-        </p:spPr>
-        <p:style>
-          <a:lnRef idx="2">
-            <a:schemeClr val="accent1">
-              <a:shade val="50000"/>
-            </a:schemeClr>
-          </a:lnRef>
-          <a:fillRef idx="1">
-            <a:schemeClr val="accent1"/>
-          </a:fillRef>
-          <a:effectRef idx="0">
-            <a:schemeClr val="accent1"/>
-          </a:effectRef>
-          <a:fontRef idx="minor">
-            <a:schemeClr val="lt1"/>
-          </a:fontRef>
-        </p:style>
-        <p:txBody>
-          <a:bodyPr rtlCol="0" anchor="ctr"/>
-          <a:lstStyle/>
-          <a:p>
-            <a:pPr algn="ctr"/>
-            <a:r>
-              <a:rPr lang="en-US" sz="1400" dirty="0" err="1" smtClean="0">
-                <a:solidFill>
-                  <a:schemeClr val="tx1"/>
-                </a:solidFill>
-              </a:rPr>
-              <a:t>JmsProtocolBuilder</a:t>
-            </a:r>
-            <a:endParaRPr lang="en-US" sz="1400" dirty="0">
-              <a:solidFill>
-                <a:schemeClr val="tx1"/>
-              </a:solidFill>
-            </a:endParaRPr>
-          </a:p>
-        </p:txBody>
-      </p:sp>
-      <p:sp>
-        <p:nvSpPr>
-          <p:cNvPr id="9" name="Прямоугольник 8"/>
-          <p:cNvSpPr/>
-          <p:nvPr/>
-        </p:nvSpPr>
-        <p:spPr>
-          <a:xfrm>
-            <a:off x="1500166" y="1357298"/>
-            <a:ext cx="2071702" cy="714380"/>
-          </a:xfrm>
-          <a:prstGeom prst="rect">
-            <a:avLst/>
-          </a:prstGeom>
-          <a:solidFill>
-            <a:schemeClr val="bg1"/>
-          </a:solidFill>
-        </p:spPr>
-        <p:style>
-          <a:lnRef idx="2">
-            <a:schemeClr val="accent1">
-              <a:shade val="50000"/>
-            </a:schemeClr>
-          </a:lnRef>
-          <a:fillRef idx="1">
-            <a:schemeClr val="accent1"/>
-          </a:fillRef>
-          <a:effectRef idx="0">
-            <a:schemeClr val="accent1"/>
-          </a:effectRef>
-          <a:fontRef idx="minor">
-            <a:schemeClr val="lt1"/>
-          </a:fontRef>
-        </p:style>
-        <p:txBody>
-          <a:bodyPr rtlCol="0" anchor="ctr"/>
-          <a:lstStyle/>
-          <a:p>
-            <a:pPr algn="ctr"/>
-            <a:r>
-              <a:rPr lang="en-US" sz="1400" dirty="0" err="1" smtClean="0">
-                <a:solidFill>
-                  <a:schemeClr val="tx1"/>
-                </a:solidFill>
-              </a:rPr>
-              <a:t>ActionBuilder</a:t>
-            </a:r>
-            <a:endParaRPr lang="en-US" sz="1400" dirty="0">
-              <a:solidFill>
-                <a:schemeClr val="tx1"/>
-              </a:solidFill>
-            </a:endParaRPr>
-          </a:p>
-        </p:txBody>
-      </p:sp>
-      <p:sp>
-        <p:nvSpPr>
-          <p:cNvPr id="10" name="Прямоугольник 9"/>
-          <p:cNvSpPr/>
-          <p:nvPr/>
-        </p:nvSpPr>
-        <p:spPr>
-          <a:xfrm>
-            <a:off x="3143240" y="3571876"/>
-            <a:ext cx="2071702" cy="714380"/>
-          </a:xfrm>
-          <a:prstGeom prst="rect">
-            <a:avLst/>
-          </a:prstGeom>
-          <a:solidFill>
-            <a:schemeClr val="bg1"/>
-          </a:solidFill>
-        </p:spPr>
-        <p:style>
-          <a:lnRef idx="2">
-            <a:schemeClr val="accent1">
-              <a:shade val="50000"/>
-            </a:schemeClr>
-          </a:lnRef>
-          <a:fillRef idx="1">
-            <a:schemeClr val="accent1"/>
-          </a:fillRef>
-          <a:effectRef idx="0">
-            <a:schemeClr val="accent1"/>
-          </a:effectRef>
-          <a:fontRef idx="minor">
-            <a:schemeClr val="lt1"/>
-          </a:fontRef>
-        </p:style>
-        <p:txBody>
-          <a:bodyPr rtlCol="0" anchor="ctr"/>
-          <a:lstStyle/>
-          <a:p>
-            <a:pPr algn="ctr"/>
-            <a:r>
-              <a:rPr lang="en-US" sz="1400" dirty="0" smtClean="0">
-                <a:solidFill>
-                  <a:schemeClr val="tx1"/>
-                </a:solidFill>
-              </a:rPr>
-              <a:t>Simulation</a:t>
-            </a:r>
-          </a:p>
-        </p:txBody>
-      </p:sp>
-      <p:cxnSp>
-        <p:nvCxnSpPr>
-          <p:cNvPr id="21" name="Прямая со стрелкой 20"/>
-          <p:cNvCxnSpPr/>
-          <p:nvPr/>
-        </p:nvCxnSpPr>
-        <p:spPr>
-          <a:xfrm rot="5400000" flipH="1" flipV="1">
-            <a:off x="4000496" y="4429132"/>
-            <a:ext cx="285752" cy="1588"/>
-          </a:xfrm>
-          <a:prstGeom prst="straightConnector1">
-            <a:avLst/>
-          </a:prstGeom>
-          <a:ln>
-            <a:tailEnd type="arrow"/>
-          </a:ln>
-        </p:spPr>
-        <p:style>
-          <a:lnRef idx="1">
-            <a:schemeClr val="accent1"/>
-          </a:lnRef>
-          <a:fillRef idx="0">
-            <a:schemeClr val="accent1"/>
-          </a:fillRef>
-          <a:effectRef idx="0">
-            <a:schemeClr val="accent1"/>
-          </a:effectRef>
-          <a:fontRef idx="minor">
-            <a:schemeClr val="tx1"/>
-          </a:fontRef>
-        </p:style>
-      </p:cxnSp>
-      <p:sp>
-        <p:nvSpPr>
-          <p:cNvPr id="31" name="Прямоугольник 30"/>
-          <p:cNvSpPr/>
-          <p:nvPr/>
-        </p:nvSpPr>
-        <p:spPr>
-          <a:xfrm>
-            <a:off x="1500166" y="2500306"/>
-            <a:ext cx="2071702" cy="714380"/>
-          </a:xfrm>
-          <a:prstGeom prst="rect">
-            <a:avLst/>
-          </a:prstGeom>
-          <a:solidFill>
-            <a:schemeClr val="bg1"/>
-          </a:solidFill>
-        </p:spPr>
-        <p:style>
-          <a:lnRef idx="2">
-            <a:schemeClr val="accent1">
-              <a:shade val="50000"/>
-            </a:schemeClr>
-          </a:lnRef>
-          <a:fillRef idx="1">
-            <a:schemeClr val="accent1"/>
-          </a:fillRef>
-          <a:effectRef idx="0">
-            <a:schemeClr val="accent1"/>
-          </a:effectRef>
-          <a:fontRef idx="minor">
-            <a:schemeClr val="lt1"/>
-          </a:fontRef>
-        </p:style>
-        <p:txBody>
-          <a:bodyPr rtlCol="0" anchor="ctr"/>
-          <a:lstStyle/>
-          <a:p>
-            <a:pPr algn="ctr"/>
-            <a:r>
-              <a:rPr lang="en-US" sz="1400" dirty="0" err="1" smtClean="0">
-                <a:solidFill>
-                  <a:schemeClr val="tx1"/>
-                </a:solidFill>
-              </a:rPr>
-              <a:t>ScenarioBuilder</a:t>
-            </a:r>
-            <a:endParaRPr lang="en-US" sz="1400" dirty="0">
-              <a:solidFill>
-                <a:schemeClr val="tx1"/>
-              </a:solidFill>
-            </a:endParaRPr>
-          </a:p>
-        </p:txBody>
-      </p:sp>
-      <p:sp>
-        <p:nvSpPr>
-          <p:cNvPr id="32" name="Прямоугольник 31"/>
-          <p:cNvSpPr/>
-          <p:nvPr/>
-        </p:nvSpPr>
-        <p:spPr>
-          <a:xfrm>
-            <a:off x="1643042" y="1571612"/>
-            <a:ext cx="2071702" cy="714380"/>
-          </a:xfrm>
-          <a:prstGeom prst="rect">
-            <a:avLst/>
-          </a:prstGeom>
-          <a:solidFill>
-            <a:schemeClr val="bg1"/>
-          </a:solidFill>
-        </p:spPr>
-        <p:style>
-          <a:lnRef idx="2">
-            <a:schemeClr val="accent1">
-              <a:shade val="50000"/>
-            </a:schemeClr>
-          </a:lnRef>
-          <a:fillRef idx="1">
-            <a:schemeClr val="accent1"/>
-          </a:fillRef>
-          <a:effectRef idx="0">
-            <a:schemeClr val="accent1"/>
-          </a:effectRef>
-          <a:fontRef idx="minor">
-            <a:schemeClr val="lt1"/>
-          </a:fontRef>
-        </p:style>
-        <p:txBody>
-          <a:bodyPr rtlCol="0" anchor="ctr"/>
-          <a:lstStyle/>
-          <a:p>
-            <a:pPr algn="ctr"/>
-            <a:r>
-              <a:rPr lang="en-US" sz="1400" dirty="0" err="1" smtClean="0">
-                <a:solidFill>
-                  <a:schemeClr val="tx1"/>
-                </a:solidFill>
-              </a:rPr>
-              <a:t>ActionBuilder</a:t>
-            </a:r>
-            <a:endParaRPr lang="en-US" sz="1400" dirty="0">
-              <a:solidFill>
-                <a:schemeClr val="tx1"/>
-              </a:solidFill>
-            </a:endParaRPr>
-          </a:p>
-        </p:txBody>
-      </p:sp>
-      <p:cxnSp>
-        <p:nvCxnSpPr>
-          <p:cNvPr id="34" name="Прямая со стрелкой 33"/>
-          <p:cNvCxnSpPr/>
-          <p:nvPr/>
-        </p:nvCxnSpPr>
-        <p:spPr>
-          <a:xfrm rot="5400000">
-            <a:off x="2321703" y="2393149"/>
-            <a:ext cx="214314" cy="1588"/>
-          </a:xfrm>
-          <a:prstGeom prst="straightConnector1">
-            <a:avLst/>
-          </a:prstGeom>
-          <a:ln>
-            <a:tailEnd type="arrow"/>
-          </a:ln>
-        </p:spPr>
-        <p:style>
-          <a:lnRef idx="1">
-            <a:schemeClr val="accent1"/>
-          </a:lnRef>
-          <a:fillRef idx="0">
-            <a:schemeClr val="accent1"/>
-          </a:fillRef>
-          <a:effectRef idx="0">
-            <a:schemeClr val="accent1"/>
-          </a:effectRef>
-          <a:fontRef idx="minor">
-            <a:schemeClr val="tx1"/>
-          </a:fontRef>
-        </p:style>
-      </p:cxnSp>
-      <p:cxnSp>
-        <p:nvCxnSpPr>
-          <p:cNvPr id="36" name="Прямая со стрелкой 35"/>
-          <p:cNvCxnSpPr>
-            <a:stCxn id="31" idx="2"/>
-          </p:cNvCxnSpPr>
-          <p:nvPr/>
-        </p:nvCxnSpPr>
-        <p:spPr>
-          <a:xfrm rot="16200000" flipH="1">
-            <a:off x="2661033" y="3089669"/>
-            <a:ext cx="357192" cy="607225"/>
-          </a:xfrm>
-          <a:prstGeom prst="straightConnector1">
-            <a:avLst/>
-          </a:prstGeom>
-          <a:ln>
-            <a:tailEnd type="arrow"/>
-          </a:ln>
-        </p:spPr>
-        <p:style>
-          <a:lnRef idx="1">
-            <a:schemeClr val="accent1"/>
-          </a:lnRef>
-          <a:fillRef idx="0">
-            <a:schemeClr val="accent1"/>
-          </a:fillRef>
-          <a:effectRef idx="0">
-            <a:schemeClr val="accent1"/>
-          </a:effectRef>
-          <a:fontRef idx="minor">
-            <a:schemeClr val="tx1"/>
-          </a:fontRef>
-        </p:style>
-      </p:cxnSp>
-      <p:sp>
-        <p:nvSpPr>
-          <p:cNvPr id="39" name="Прямоугольник 38"/>
-          <p:cNvSpPr/>
-          <p:nvPr/>
-        </p:nvSpPr>
-        <p:spPr>
-          <a:xfrm>
-            <a:off x="4929190" y="1428736"/>
-            <a:ext cx="2071702" cy="714380"/>
-          </a:xfrm>
-          <a:prstGeom prst="rect">
-            <a:avLst/>
-          </a:prstGeom>
-          <a:solidFill>
-            <a:schemeClr val="bg1"/>
-          </a:solidFill>
-        </p:spPr>
-        <p:style>
-          <a:lnRef idx="2">
-            <a:schemeClr val="accent1">
-              <a:shade val="50000"/>
-            </a:schemeClr>
-          </a:lnRef>
-          <a:fillRef idx="1">
-            <a:schemeClr val="accent1"/>
-          </a:fillRef>
-          <a:effectRef idx="0">
-            <a:schemeClr val="accent1"/>
-          </a:effectRef>
-          <a:fontRef idx="minor">
-            <a:schemeClr val="lt1"/>
-          </a:fontRef>
-        </p:style>
-        <p:txBody>
-          <a:bodyPr rtlCol="0" anchor="ctr"/>
-          <a:lstStyle/>
-          <a:p>
-            <a:pPr algn="ctr"/>
-            <a:r>
-              <a:rPr lang="en-US" sz="1400" dirty="0" err="1" smtClean="0">
-                <a:solidFill>
-                  <a:schemeClr val="tx1"/>
-                </a:solidFill>
-              </a:rPr>
-              <a:t>ActionBuilder</a:t>
-            </a:r>
-            <a:endParaRPr lang="en-US" sz="1400" dirty="0">
-              <a:solidFill>
-                <a:schemeClr val="tx1"/>
-              </a:solidFill>
-            </a:endParaRPr>
-          </a:p>
-        </p:txBody>
-      </p:sp>
-      <p:sp>
-        <p:nvSpPr>
-          <p:cNvPr id="40" name="Прямоугольник 39"/>
-          <p:cNvSpPr/>
-          <p:nvPr/>
-        </p:nvSpPr>
-        <p:spPr>
-          <a:xfrm>
-            <a:off x="4929190" y="2571744"/>
-            <a:ext cx="2071702" cy="714380"/>
-          </a:xfrm>
-          <a:prstGeom prst="rect">
-            <a:avLst/>
-          </a:prstGeom>
-          <a:solidFill>
-            <a:schemeClr val="bg1"/>
-          </a:solidFill>
-        </p:spPr>
-        <p:style>
-          <a:lnRef idx="2">
-            <a:schemeClr val="accent1">
-              <a:shade val="50000"/>
-            </a:schemeClr>
-          </a:lnRef>
-          <a:fillRef idx="1">
-            <a:schemeClr val="accent1"/>
-          </a:fillRef>
-          <a:effectRef idx="0">
-            <a:schemeClr val="accent1"/>
-          </a:effectRef>
-          <a:fontRef idx="minor">
-            <a:schemeClr val="lt1"/>
-          </a:fontRef>
-        </p:style>
-        <p:txBody>
-          <a:bodyPr rtlCol="0" anchor="ctr"/>
-          <a:lstStyle/>
-          <a:p>
-            <a:pPr algn="ctr"/>
-            <a:r>
-              <a:rPr lang="en-US" sz="1400" dirty="0" err="1" smtClean="0">
-                <a:solidFill>
-                  <a:schemeClr val="tx1"/>
-                </a:solidFill>
-              </a:rPr>
-              <a:t>ScenarioBuilder</a:t>
-            </a:r>
-            <a:endParaRPr lang="en-US" sz="1400" dirty="0">
-              <a:solidFill>
-                <a:schemeClr val="tx1"/>
-              </a:solidFill>
-            </a:endParaRPr>
-          </a:p>
-        </p:txBody>
-      </p:sp>
-      <p:sp>
-        <p:nvSpPr>
-          <p:cNvPr id="41" name="Прямоугольник 40"/>
-          <p:cNvSpPr/>
-          <p:nvPr/>
-        </p:nvSpPr>
-        <p:spPr>
-          <a:xfrm>
-            <a:off x="5072066" y="1643050"/>
-            <a:ext cx="2071702" cy="714380"/>
-          </a:xfrm>
-          <a:prstGeom prst="rect">
-            <a:avLst/>
-          </a:prstGeom>
-          <a:solidFill>
-            <a:schemeClr val="bg1"/>
-          </a:solidFill>
-        </p:spPr>
-        <p:style>
-          <a:lnRef idx="2">
-            <a:schemeClr val="accent1">
-              <a:shade val="50000"/>
-            </a:schemeClr>
-          </a:lnRef>
-          <a:fillRef idx="1">
-            <a:schemeClr val="accent1"/>
-          </a:fillRef>
-          <a:effectRef idx="0">
-            <a:schemeClr val="accent1"/>
-          </a:effectRef>
-          <a:fontRef idx="minor">
-            <a:schemeClr val="lt1"/>
-          </a:fontRef>
-        </p:style>
-        <p:txBody>
-          <a:bodyPr rtlCol="0" anchor="ctr"/>
-          <a:lstStyle/>
-          <a:p>
-            <a:pPr algn="ctr"/>
-            <a:r>
-              <a:rPr lang="en-US" sz="1400" dirty="0" err="1" smtClean="0">
-                <a:solidFill>
-                  <a:schemeClr val="tx1"/>
-                </a:solidFill>
-              </a:rPr>
-              <a:t>ActionBuilder</a:t>
-            </a:r>
-            <a:endParaRPr lang="en-US" sz="1400" dirty="0">
-              <a:solidFill>
-                <a:schemeClr val="tx1"/>
-              </a:solidFill>
-            </a:endParaRPr>
-          </a:p>
-        </p:txBody>
-      </p:sp>
-      <p:cxnSp>
-        <p:nvCxnSpPr>
-          <p:cNvPr id="42" name="Прямая со стрелкой 41"/>
-          <p:cNvCxnSpPr/>
-          <p:nvPr/>
-        </p:nvCxnSpPr>
-        <p:spPr>
-          <a:xfrm rot="5400000">
-            <a:off x="5750727" y="2464587"/>
-            <a:ext cx="214314" cy="1588"/>
-          </a:xfrm>
-          <a:prstGeom prst="straightConnector1">
-            <a:avLst/>
-          </a:prstGeom>
-          <a:ln>
-            <a:tailEnd type="arrow"/>
-          </a:ln>
-        </p:spPr>
-        <p:style>
-          <a:lnRef idx="1">
-            <a:schemeClr val="accent1"/>
-          </a:lnRef>
-          <a:fillRef idx="0">
-            <a:schemeClr val="accent1"/>
-          </a:fillRef>
-          <a:effectRef idx="0">
-            <a:schemeClr val="accent1"/>
-          </a:effectRef>
-          <a:fontRef idx="minor">
-            <a:schemeClr val="tx1"/>
-          </a:fontRef>
-        </p:style>
-      </p:cxnSp>
-      <p:cxnSp>
-        <p:nvCxnSpPr>
-          <p:cNvPr id="43" name="Прямая со стрелкой 42"/>
-          <p:cNvCxnSpPr>
-            <a:stCxn id="40" idx="2"/>
-          </p:cNvCxnSpPr>
-          <p:nvPr/>
-        </p:nvCxnSpPr>
-        <p:spPr>
-          <a:xfrm rot="5400000">
-            <a:off x="5447115" y="3053952"/>
-            <a:ext cx="285754" cy="750099"/>
-          </a:xfrm>
-          <a:prstGeom prst="straightConnector1">
-            <a:avLst/>
-          </a:prstGeom>
-          <a:ln>
-            <a:tailEnd type="arrow"/>
-          </a:ln>
-        </p:spPr>
-        <p:style>
-          <a:lnRef idx="1">
-            <a:schemeClr val="accent1"/>
-          </a:lnRef>
-          <a:fillRef idx="0">
-            <a:schemeClr val="accent1"/>
-          </a:fillRef>
-          <a:effectRef idx="0">
-            <a:schemeClr val="accent1"/>
-          </a:effectRef>
-          <a:fontRef idx="minor">
-            <a:schemeClr val="tx1"/>
-          </a:fontRef>
-        </p:style>
-      </p:cxnSp>
-      <p:sp>
-        <p:nvSpPr>
-          <p:cNvPr id="48" name="TextBox 47"/>
-          <p:cNvSpPr txBox="1"/>
-          <p:nvPr/>
-        </p:nvSpPr>
-        <p:spPr>
-          <a:xfrm>
-            <a:off x="285720" y="2500306"/>
-            <a:ext cx="1173655" cy="307777"/>
-          </a:xfrm>
-          <a:prstGeom prst="rect">
-            <a:avLst/>
-          </a:prstGeom>
-          <a:noFill/>
-        </p:spPr>
-        <p:txBody>
-          <a:bodyPr wrap="none" rtlCol="0">
-            <a:spAutoFit/>
-          </a:bodyPr>
-          <a:lstStyle/>
-          <a:p>
-            <a:r>
-              <a:rPr lang="ru-RU" sz="1400" dirty="0" smtClean="0"/>
-              <a:t>Сценарий </a:t>
-            </a:r>
-            <a:r>
-              <a:rPr lang="en-US" sz="1400" dirty="0" smtClean="0"/>
-              <a:t>#1</a:t>
-            </a:r>
-            <a:endParaRPr lang="ru-RU" sz="1400" dirty="0"/>
-          </a:p>
-        </p:txBody>
-      </p:sp>
-      <p:sp>
-        <p:nvSpPr>
-          <p:cNvPr id="49" name="TextBox 48"/>
-          <p:cNvSpPr txBox="1"/>
-          <p:nvPr/>
-        </p:nvSpPr>
-        <p:spPr>
-          <a:xfrm>
-            <a:off x="7072330" y="2571744"/>
-            <a:ext cx="1425005" cy="307777"/>
-          </a:xfrm>
-          <a:prstGeom prst="rect">
-            <a:avLst/>
-          </a:prstGeom>
-          <a:noFill/>
-        </p:spPr>
-        <p:txBody>
-          <a:bodyPr wrap="none" rtlCol="0">
-            <a:spAutoFit/>
-          </a:bodyPr>
-          <a:lstStyle/>
-          <a:p>
-            <a:r>
-              <a:rPr lang="ru-RU" sz="1400" dirty="0" smtClean="0"/>
-              <a:t>Сценарий </a:t>
-            </a:r>
-            <a:r>
-              <a:rPr lang="en-US" sz="1400" dirty="0" smtClean="0"/>
-              <a:t>#2, …</a:t>
-            </a:r>
-            <a:endParaRPr lang="ru-RU" sz="1400" dirty="0"/>
-          </a:p>
-        </p:txBody>
-      </p:sp>
-      <p:sp>
-        <p:nvSpPr>
-          <p:cNvPr id="50" name="TextBox 49"/>
-          <p:cNvSpPr txBox="1"/>
-          <p:nvPr/>
-        </p:nvSpPr>
-        <p:spPr>
-          <a:xfrm>
-            <a:off x="357158" y="1428736"/>
-            <a:ext cx="899798" cy="307777"/>
-          </a:xfrm>
-          <a:prstGeom prst="rect">
-            <a:avLst/>
-          </a:prstGeom>
-          <a:noFill/>
-        </p:spPr>
-        <p:txBody>
-          <a:bodyPr wrap="none" rtlCol="0">
-            <a:spAutoFit/>
-          </a:bodyPr>
-          <a:lstStyle/>
-          <a:p>
-            <a:r>
-              <a:rPr lang="ru-RU" sz="1400" dirty="0" smtClean="0"/>
-              <a:t>Действия</a:t>
-            </a:r>
-            <a:endParaRPr lang="ru-RU" sz="1400" dirty="0"/>
-          </a:p>
-        </p:txBody>
-      </p:sp>
-      <p:sp>
-        <p:nvSpPr>
-          <p:cNvPr id="51" name="TextBox 50"/>
-          <p:cNvSpPr txBox="1"/>
-          <p:nvPr/>
-        </p:nvSpPr>
-        <p:spPr>
-          <a:xfrm>
-            <a:off x="7500958" y="1500174"/>
-            <a:ext cx="899798" cy="307777"/>
-          </a:xfrm>
-          <a:prstGeom prst="rect">
-            <a:avLst/>
-          </a:prstGeom>
-          <a:noFill/>
-        </p:spPr>
-        <p:txBody>
-          <a:bodyPr wrap="none" rtlCol="0">
-            <a:spAutoFit/>
-          </a:bodyPr>
-          <a:lstStyle/>
-          <a:p>
-            <a:r>
-              <a:rPr lang="ru-RU" sz="1400" dirty="0" smtClean="0"/>
-              <a:t>Действия</a:t>
-            </a:r>
-            <a:endParaRPr lang="ru-RU" sz="1400" dirty="0"/>
-          </a:p>
-        </p:txBody>
-      </p:sp>
-      <p:sp>
-        <p:nvSpPr>
-          <p:cNvPr id="52" name="TextBox 51"/>
-          <p:cNvSpPr txBox="1"/>
-          <p:nvPr/>
-        </p:nvSpPr>
-        <p:spPr>
-          <a:xfrm>
-            <a:off x="1357290" y="3714752"/>
-            <a:ext cx="1768433" cy="523220"/>
-          </a:xfrm>
-          <a:prstGeom prst="rect">
-            <a:avLst/>
-          </a:prstGeom>
-          <a:noFill/>
-        </p:spPr>
-        <p:txBody>
-          <a:bodyPr wrap="none" rtlCol="0">
-            <a:spAutoFit/>
-          </a:bodyPr>
-          <a:lstStyle/>
-          <a:p>
-            <a:r>
-              <a:rPr lang="ru-RU" sz="1400" dirty="0" smtClean="0"/>
-              <a:t>Симуляция, </a:t>
-            </a:r>
-            <a:br>
-              <a:rPr lang="ru-RU" sz="1400" dirty="0" smtClean="0"/>
-            </a:br>
-            <a:r>
-              <a:rPr lang="ru-RU" sz="1400" dirty="0" smtClean="0"/>
-              <a:t>собственно, сам тест</a:t>
-            </a:r>
-            <a:endParaRPr lang="ru-RU" sz="1400" dirty="0"/>
-          </a:p>
-        </p:txBody>
-      </p:sp>
-      <p:cxnSp>
-        <p:nvCxnSpPr>
-          <p:cNvPr id="59" name="Прямая со стрелкой 58"/>
-          <p:cNvCxnSpPr/>
-          <p:nvPr/>
-        </p:nvCxnSpPr>
-        <p:spPr>
-          <a:xfrm rot="5400000" flipH="1" flipV="1">
-            <a:off x="4001290" y="5428470"/>
-            <a:ext cx="285752" cy="1588"/>
-          </a:xfrm>
-          <a:prstGeom prst="straightConnector1">
-            <a:avLst/>
-          </a:prstGeom>
-          <a:ln>
-            <a:tailEnd type="arrow"/>
-          </a:ln>
-        </p:spPr>
-        <p:style>
-          <a:lnRef idx="1">
-            <a:schemeClr val="accent1"/>
-          </a:lnRef>
-          <a:fillRef idx="0">
-            <a:schemeClr val="accent1"/>
-          </a:fillRef>
-          <a:effectRef idx="0">
-            <a:schemeClr val="accent1"/>
-          </a:effectRef>
-          <a:fontRef idx="minor">
-            <a:schemeClr val="tx1"/>
-          </a:fontRef>
-        </p:style>
-      </p:cxnSp>
-      <p:sp>
-        <p:nvSpPr>
-          <p:cNvPr id="60" name="TextBox 59"/>
-          <p:cNvSpPr txBox="1"/>
-          <p:nvPr/>
-        </p:nvSpPr>
-        <p:spPr>
-          <a:xfrm>
-            <a:off x="1357290" y="4714884"/>
-            <a:ext cx="1772024" cy="307777"/>
-          </a:xfrm>
-          <a:prstGeom prst="rect">
-            <a:avLst/>
-          </a:prstGeom>
-          <a:noFill/>
-        </p:spPr>
-        <p:txBody>
-          <a:bodyPr wrap="none" rtlCol="0">
-            <a:spAutoFit/>
-          </a:bodyPr>
-          <a:lstStyle/>
-          <a:p>
-            <a:r>
-              <a:rPr lang="ru-RU" sz="1400" dirty="0" smtClean="0"/>
-              <a:t>Описание протокола</a:t>
-            </a:r>
-            <a:endParaRPr lang="ru-RU" sz="1400" dirty="0"/>
-          </a:p>
-        </p:txBody>
-      </p:sp>
-      <p:sp>
-        <p:nvSpPr>
-          <p:cNvPr id="61" name="TextBox 60"/>
-          <p:cNvSpPr txBox="1"/>
-          <p:nvPr/>
-        </p:nvSpPr>
-        <p:spPr>
-          <a:xfrm>
-            <a:off x="1357290" y="5786454"/>
-            <a:ext cx="1825884" cy="307777"/>
-          </a:xfrm>
-          <a:prstGeom prst="rect">
-            <a:avLst/>
-          </a:prstGeom>
-          <a:noFill/>
-        </p:spPr>
-        <p:txBody>
-          <a:bodyPr wrap="none" rtlCol="0">
-            <a:spAutoFit/>
-          </a:bodyPr>
-          <a:lstStyle/>
-          <a:p>
-            <a:r>
-              <a:rPr lang="ru-RU" sz="1400" dirty="0" smtClean="0"/>
-              <a:t>Фабрика соединений</a:t>
-            </a:r>
-            <a:endParaRPr lang="ru-RU" sz="1400" dirty="0"/>
-          </a:p>
-        </p:txBody>
-      </p:sp>
-    </p:spTree>
-  </p:cSld>
-  <p:clrMapOvr>
-    <a:masterClrMapping/>
-  </p:clrMapOvr>
-  <p:timing>
-    <p:tnLst>
-      <p:par>
-        <p:cTn id="1" dur="indefinite" restart="never" nodeType="tmRoot"/>
-      </p:par>
-    </p:tnLst>
-  </p:timing>
-</p:sld>
-</file>
-
-<file path=ppt/slides/slide4.xml><?xml version="1.0" encoding="utf-8"?>
 <p:sld xmlns:a="http://schemas.openxmlformats.org/drawingml/2006/main" xmlns:r="http://schemas.openxmlformats.org/officeDocument/2006/relationships" xmlns:p="http://schemas.openxmlformats.org/presentationml/2006/main">
   <p:cSld>
     <p:spTree>

</xml_diff>